<commit_message>
Merged using R slides
</commit_message>
<xml_diff>
--- a/Rmd/img/R Data Structures.pptx
+++ b/Rmd/img/R Data Structures.pptx
@@ -104,6 +104,11 @@
       </a:defRPr>
     </a:lvl9pPr>
   </p:defaultTextStyle>
+  <p:extLst>
+    <p:ext uri="{EFAFB233-063F-42B5-8137-9DF3F51BA10A}">
+      <p15:sldGuideLst xmlns:p15="http://schemas.microsoft.com/office/powerpoint/2012/main"/>
+    </p:ext>
+  </p:extLst>
 </p:presentation>
 </file>
 
@@ -2972,7 +2977,7 @@
         </p:nvGrpSpPr>
         <p:grpSpPr>
           <a:xfrm>
-            <a:off x="2282055" y="1658351"/>
+            <a:off x="3241723" y="1658351"/>
             <a:ext cx="2327565" cy="852055"/>
             <a:chOff x="789709" y="633845"/>
             <a:chExt cx="2327565" cy="852055"/>
@@ -3107,7 +3112,7 @@
         </p:nvGrpSpPr>
         <p:grpSpPr>
           <a:xfrm>
-            <a:off x="4998025" y="1684441"/>
+            <a:off x="5957693" y="1684441"/>
             <a:ext cx="2327565" cy="2369129"/>
             <a:chOff x="789709" y="3054926"/>
             <a:chExt cx="2327565" cy="2369129"/>
@@ -3482,7 +3487,7 @@
         </p:nvGrpSpPr>
         <p:grpSpPr>
           <a:xfrm>
-            <a:off x="7713995" y="1658351"/>
+            <a:off x="8673663" y="1658351"/>
             <a:ext cx="2763983" cy="2795156"/>
             <a:chOff x="7148946" y="893617"/>
             <a:chExt cx="2763983" cy="2795156"/>
@@ -4577,7 +4582,7 @@
         </p:nvSpPr>
         <p:spPr>
           <a:xfrm>
-            <a:off x="2024767" y="484112"/>
+            <a:off x="2984435" y="484112"/>
             <a:ext cx="3018647" cy="1200329"/>
           </a:xfrm>
           <a:prstGeom prst="rect">
@@ -4594,7 +4599,7 @@
             <a:pPr algn="ctr"/>
             <a:r>
               <a:rPr lang="en-AU" b="1" dirty="0" smtClean="0"/>
-              <a:t>Vector</a:t>
+              <a:t>Vector c()</a:t>
             </a:r>
           </a:p>
           <a:p>
@@ -4628,7 +4633,7 @@
         </p:nvSpPr>
         <p:spPr>
           <a:xfrm>
-            <a:off x="4882097" y="517549"/>
+            <a:off x="5841765" y="517549"/>
             <a:ext cx="2559419" cy="923330"/>
           </a:xfrm>
           <a:prstGeom prst="rect">
@@ -4645,7 +4650,7 @@
             <a:pPr algn="ctr"/>
             <a:r>
               <a:rPr lang="en-AU" b="1" dirty="0" smtClean="0"/>
-              <a:t>Matrix</a:t>
+              <a:t>matrix()</a:t>
             </a:r>
           </a:p>
           <a:p>
@@ -4672,7 +4677,7 @@
         </p:nvSpPr>
         <p:spPr>
           <a:xfrm>
-            <a:off x="8016111" y="522600"/>
+            <a:off x="8975779" y="522600"/>
             <a:ext cx="2564228" cy="646331"/>
           </a:xfrm>
           <a:prstGeom prst="rect">
@@ -4689,7 +4694,7 @@
             <a:pPr algn="ctr"/>
             <a:r>
               <a:rPr lang="en-AU" b="1" dirty="0" smtClean="0"/>
-              <a:t>Array</a:t>
+              <a:t>array()</a:t>
             </a:r>
           </a:p>
           <a:p>
@@ -4709,7 +4714,7 @@
         </p:nvSpPr>
         <p:spPr>
           <a:xfrm>
-            <a:off x="6141880" y="4560180"/>
+            <a:off x="7101548" y="4560180"/>
             <a:ext cx="3748462" cy="646331"/>
           </a:xfrm>
           <a:prstGeom prst="rect">
@@ -4726,7 +4731,7 @@
             <a:pPr algn="ctr"/>
             <a:r>
               <a:rPr lang="en-AU" b="1" dirty="0" smtClean="0"/>
-              <a:t>List</a:t>
+              <a:t>list()</a:t>
             </a:r>
           </a:p>
           <a:p>
@@ -4746,7 +4751,7 @@
         </p:nvSpPr>
         <p:spPr>
           <a:xfrm>
-            <a:off x="5996558" y="5283283"/>
+            <a:off x="6956226" y="5283283"/>
             <a:ext cx="852055" cy="852055"/>
           </a:xfrm>
           <a:prstGeom prst="cube">
@@ -4786,7 +4791,7 @@
         </p:nvSpPr>
         <p:spPr>
           <a:xfrm>
-            <a:off x="6734313" y="5283283"/>
+            <a:off x="7693981" y="5283283"/>
             <a:ext cx="852055" cy="852055"/>
           </a:xfrm>
           <a:prstGeom prst="cube">
@@ -4830,7 +4835,7 @@
         </p:nvGrpSpPr>
         <p:grpSpPr>
           <a:xfrm>
-            <a:off x="7484660" y="5283283"/>
+            <a:off x="8444328" y="5283283"/>
             <a:ext cx="838347" cy="853317"/>
             <a:chOff x="789709" y="3054926"/>
             <a:chExt cx="2327565" cy="2369129"/>
@@ -5223,7 +5228,7 @@
         </p:nvGrpSpPr>
         <p:grpSpPr>
           <a:xfrm>
-            <a:off x="7477807" y="5283283"/>
+            <a:off x="8437475" y="5283283"/>
             <a:ext cx="838347" cy="853317"/>
             <a:chOff x="789709" y="3054926"/>
             <a:chExt cx="2327565" cy="2369129"/>
@@ -5598,7 +5603,7 @@
         </p:nvGrpSpPr>
         <p:grpSpPr>
           <a:xfrm>
-            <a:off x="2282055" y="3769685"/>
+            <a:off x="3450194" y="4021946"/>
             <a:ext cx="2327565" cy="2369129"/>
             <a:chOff x="521119" y="3763365"/>
             <a:chExt cx="2327565" cy="2369129"/>
@@ -5973,7 +5978,7 @@
         </p:nvSpPr>
         <p:spPr>
           <a:xfrm>
-            <a:off x="2787443" y="3123354"/>
+            <a:off x="3955582" y="3375615"/>
             <a:ext cx="1493294" cy="646331"/>
           </a:xfrm>
           <a:prstGeom prst="rect">
@@ -5989,8 +5994,12 @@
           <a:p>
             <a:pPr algn="ctr"/>
             <a:r>
+              <a:rPr lang="en-AU" b="1" dirty="0" err="1" smtClean="0"/>
+              <a:t>data.frame</a:t>
+            </a:r>
+            <a:r>
               <a:rPr lang="en-AU" b="1" dirty="0" smtClean="0"/>
-              <a:t>Data Frame</a:t>
+              <a:t>()</a:t>
             </a:r>
           </a:p>
           <a:p>
@@ -6010,7 +6019,7 @@
         </p:nvGrpSpPr>
         <p:grpSpPr>
           <a:xfrm>
-            <a:off x="8237215" y="5283284"/>
+            <a:off x="9196883" y="5283284"/>
             <a:ext cx="839009" cy="848472"/>
             <a:chOff x="7148946" y="893617"/>
             <a:chExt cx="2763983" cy="2795156"/>
@@ -7105,7 +7114,7 @@
         </p:nvGrpSpPr>
         <p:grpSpPr>
           <a:xfrm>
-            <a:off x="8967242" y="5283283"/>
+            <a:off x="9926910" y="5283283"/>
             <a:ext cx="833586" cy="848472"/>
             <a:chOff x="521119" y="3763365"/>
             <a:chExt cx="2327565" cy="2369129"/>
@@ -7472,6 +7481,285 @@
           </p:txBody>
         </p:sp>
       </p:grpSp>
+      <p:sp>
+        <p:nvSpPr>
+          <p:cNvPr id="145" name="Cube 144"/>
+          <p:cNvSpPr/>
+          <p:nvPr/>
+        </p:nvSpPr>
+        <p:spPr>
+          <a:xfrm>
+            <a:off x="1412048" y="1658351"/>
+            <a:ext cx="852055" cy="852055"/>
+          </a:xfrm>
+          <a:prstGeom prst="cube">
+            <a:avLst>
+              <a:gd name="adj" fmla="val 18636"/>
+            </a:avLst>
+          </a:prstGeom>
+        </p:spPr>
+        <p:style>
+          <a:lnRef idx="3">
+            <a:schemeClr val="lt1"/>
+          </a:lnRef>
+          <a:fillRef idx="1">
+            <a:schemeClr val="accent1"/>
+          </a:fillRef>
+          <a:effectRef idx="1">
+            <a:schemeClr val="accent1"/>
+          </a:effectRef>
+          <a:fontRef idx="minor">
+            <a:schemeClr val="lt1"/>
+          </a:fontRef>
+        </p:style>
+        <p:txBody>
+          <a:bodyPr rtlCol="0" anchor="ctr"/>
+          <a:lstStyle/>
+          <a:p>
+            <a:pPr algn="ctr"/>
+            <a:endParaRPr lang="en-AU"/>
+          </a:p>
+        </p:txBody>
+      </p:sp>
+      <p:sp>
+        <p:nvSpPr>
+          <p:cNvPr id="148" name="TextBox 147"/>
+          <p:cNvSpPr txBox="1"/>
+          <p:nvPr/>
+        </p:nvSpPr>
+        <p:spPr>
+          <a:xfrm>
+            <a:off x="763058" y="484112"/>
+            <a:ext cx="2221377" cy="923330"/>
+          </a:xfrm>
+          <a:prstGeom prst="rect">
+            <a:avLst/>
+          </a:prstGeom>
+          <a:noFill/>
+        </p:spPr>
+        <p:txBody>
+          <a:bodyPr wrap="none" rtlCol="0">
+            <a:spAutoFit/>
+          </a:bodyPr>
+          <a:lstStyle/>
+          <a:p>
+            <a:pPr algn="ctr"/>
+            <a:r>
+              <a:rPr lang="en-AU" b="1" dirty="0" smtClean="0"/>
+              <a:t>Scalar</a:t>
+            </a:r>
+            <a:endParaRPr lang="en-AU" b="1" dirty="0" smtClean="0"/>
+          </a:p>
+          <a:p>
+            <a:pPr algn="ctr"/>
+            <a:r>
+              <a:rPr lang="en-AU" dirty="0" smtClean="0"/>
+              <a:t>Vector containing just</a:t>
+            </a:r>
+            <a:br>
+              <a:rPr lang="en-AU" dirty="0" smtClean="0"/>
+            </a:br>
+            <a:r>
+              <a:rPr lang="en-AU" dirty="0" smtClean="0"/>
+              <a:t>one object</a:t>
+            </a:r>
+            <a:endParaRPr lang="en-AU" dirty="0" smtClean="0"/>
+          </a:p>
+        </p:txBody>
+      </p:sp>
+      <p:grpSp>
+        <p:nvGrpSpPr>
+          <p:cNvPr id="154" name="Group 153"/>
+          <p:cNvGrpSpPr/>
+          <p:nvPr/>
+        </p:nvGrpSpPr>
+        <p:grpSpPr>
+          <a:xfrm>
+            <a:off x="777710" y="4031290"/>
+            <a:ext cx="2327565" cy="852055"/>
+            <a:chOff x="789709" y="633845"/>
+            <a:chExt cx="2327565" cy="852055"/>
+          </a:xfrm>
+        </p:grpSpPr>
+        <p:sp>
+          <p:nvSpPr>
+            <p:cNvPr id="155" name="Cube 154"/>
+            <p:cNvSpPr/>
+            <p:nvPr/>
+          </p:nvSpPr>
+          <p:spPr>
+            <a:xfrm>
+              <a:off x="789709" y="633845"/>
+              <a:ext cx="852055" cy="852055"/>
+            </a:xfrm>
+            <a:prstGeom prst="cube">
+              <a:avLst>
+                <a:gd name="adj" fmla="val 18636"/>
+              </a:avLst>
+            </a:prstGeom>
+          </p:spPr>
+          <p:style>
+            <a:lnRef idx="3">
+              <a:schemeClr val="lt1"/>
+            </a:lnRef>
+            <a:fillRef idx="1">
+              <a:schemeClr val="accent1"/>
+            </a:fillRef>
+            <a:effectRef idx="1">
+              <a:schemeClr val="accent1"/>
+            </a:effectRef>
+            <a:fontRef idx="minor">
+              <a:schemeClr val="lt1"/>
+            </a:fontRef>
+          </p:style>
+          <p:txBody>
+            <a:bodyPr rtlCol="0" anchor="ctr"/>
+            <a:lstStyle/>
+            <a:p>
+              <a:pPr algn="ctr"/>
+              <a:r>
+                <a:rPr lang="en-AU" dirty="0" smtClean="0"/>
+                <a:t>a</a:t>
+              </a:r>
+              <a:endParaRPr lang="en-AU" dirty="0"/>
+            </a:p>
+          </p:txBody>
+        </p:sp>
+        <p:sp>
+          <p:nvSpPr>
+            <p:cNvPr id="156" name="Cube 155"/>
+            <p:cNvSpPr/>
+            <p:nvPr/>
+          </p:nvSpPr>
+          <p:spPr>
+            <a:xfrm>
+              <a:off x="1527464" y="633845"/>
+              <a:ext cx="852055" cy="852055"/>
+            </a:xfrm>
+            <a:prstGeom prst="cube">
+              <a:avLst>
+                <a:gd name="adj" fmla="val 18636"/>
+              </a:avLst>
+            </a:prstGeom>
+          </p:spPr>
+          <p:style>
+            <a:lnRef idx="3">
+              <a:schemeClr val="lt1"/>
+            </a:lnRef>
+            <a:fillRef idx="1">
+              <a:schemeClr val="accent1"/>
+            </a:fillRef>
+            <a:effectRef idx="1">
+              <a:schemeClr val="accent1"/>
+            </a:effectRef>
+            <a:fontRef idx="minor">
+              <a:schemeClr val="lt1"/>
+            </a:fontRef>
+          </p:style>
+          <p:txBody>
+            <a:bodyPr rtlCol="0" anchor="ctr"/>
+            <a:lstStyle/>
+            <a:p>
+              <a:pPr algn="ctr"/>
+              <a:r>
+                <a:rPr lang="en-AU" dirty="0" smtClean="0"/>
+                <a:t>b</a:t>
+              </a:r>
+              <a:endParaRPr lang="en-AU" dirty="0"/>
+            </a:p>
+          </p:txBody>
+        </p:sp>
+        <p:sp>
+          <p:nvSpPr>
+            <p:cNvPr id="157" name="Cube 156"/>
+            <p:cNvSpPr/>
+            <p:nvPr/>
+          </p:nvSpPr>
+          <p:spPr>
+            <a:xfrm>
+              <a:off x="2265219" y="633845"/>
+              <a:ext cx="852055" cy="852055"/>
+            </a:xfrm>
+            <a:prstGeom prst="cube">
+              <a:avLst>
+                <a:gd name="adj" fmla="val 18636"/>
+              </a:avLst>
+            </a:prstGeom>
+          </p:spPr>
+          <p:style>
+            <a:lnRef idx="3">
+              <a:schemeClr val="lt1"/>
+            </a:lnRef>
+            <a:fillRef idx="1">
+              <a:schemeClr val="accent1"/>
+            </a:fillRef>
+            <a:effectRef idx="1">
+              <a:schemeClr val="accent1"/>
+            </a:effectRef>
+            <a:fontRef idx="minor">
+              <a:schemeClr val="lt1"/>
+            </a:fontRef>
+          </p:style>
+          <p:txBody>
+            <a:bodyPr rtlCol="0" anchor="ctr"/>
+            <a:lstStyle/>
+            <a:p>
+              <a:pPr algn="ctr"/>
+              <a:r>
+                <a:rPr lang="en-AU" dirty="0" smtClean="0"/>
+                <a:t>a</a:t>
+              </a:r>
+              <a:endParaRPr lang="en-AU" dirty="0"/>
+            </a:p>
+          </p:txBody>
+        </p:sp>
+      </p:grpSp>
+      <p:sp>
+        <p:nvSpPr>
+          <p:cNvPr id="158" name="TextBox 157"/>
+          <p:cNvSpPr txBox="1"/>
+          <p:nvPr/>
+        </p:nvSpPr>
+        <p:spPr>
+          <a:xfrm>
+            <a:off x="668675" y="3025485"/>
+            <a:ext cx="2545633" cy="923330"/>
+          </a:xfrm>
+          <a:prstGeom prst="rect">
+            <a:avLst/>
+          </a:prstGeom>
+          <a:noFill/>
+        </p:spPr>
+        <p:txBody>
+          <a:bodyPr wrap="none" rtlCol="0">
+            <a:spAutoFit/>
+          </a:bodyPr>
+          <a:lstStyle/>
+          <a:p>
+            <a:pPr algn="ctr"/>
+            <a:r>
+              <a:rPr lang="en-AU" b="1" dirty="0" smtClean="0"/>
+              <a:t>factor()</a:t>
+            </a:r>
+            <a:endParaRPr lang="en-AU" b="1" dirty="0" smtClean="0"/>
+          </a:p>
+          <a:p>
+            <a:pPr algn="ctr"/>
+            <a:r>
+              <a:rPr lang="en-AU" dirty="0" smtClean="0"/>
+              <a:t>Vector that tracks unique</a:t>
+            </a:r>
+            <a:br>
+              <a:rPr lang="en-AU" dirty="0" smtClean="0"/>
+            </a:br>
+            <a:r>
+              <a:rPr lang="en-AU" dirty="0" smtClean="0"/>
+              <a:t>values (levels)</a:t>
+            </a:r>
+            <a:endParaRPr lang="en-AU" dirty="0" smtClean="0"/>
+          </a:p>
+        </p:txBody>
+      </p:sp>
     </p:spTree>
     <p:extLst>
       <p:ext uri="{BB962C8B-B14F-4D97-AF65-F5344CB8AC3E}">

</xml_diff>